<commit_message>
bai bao cao nhap mon
By Anh Tu 30/11/2017
</commit_message>
<xml_diff>
--- a/Nhom4.pptx
+++ b/Nhom4.pptx
@@ -10247,8 +10247,8 @@
         </p:nvSpPr>
         <p:spPr>
           <a:xfrm>
-            <a:off x="6324600" y="3581400"/>
-            <a:ext cx="2789290" cy="2031325"/>
+            <a:off x="5638800" y="3540711"/>
+            <a:ext cx="3370603" cy="2031325"/>
           </a:xfrm>
           <a:prstGeom prst="rect">
             <a:avLst/>
@@ -10320,6 +10320,22 @@
                 </a:solidFill>
               </a:rPr>
               <a:t>Đội</a:t>
+            </a:r>
+            <a:r>
+              <a:rPr lang="en-US" dirty="0" smtClean="0">
+                <a:solidFill>
+                  <a:srgbClr val="FF0000"/>
+                </a:solidFill>
+              </a:rPr>
+              <a:t> </a:t>
+            </a:r>
+            <a:r>
+              <a:rPr lang="en-US" dirty="0" err="1" smtClean="0">
+                <a:solidFill>
+                  <a:srgbClr val="FF0000"/>
+                </a:solidFill>
+              </a:rPr>
+              <a:t>Trưởng</a:t>
             </a:r>
             <a:r>
               <a:rPr lang="en-US" dirty="0" smtClean="0">

</xml_diff>